<commit_message>
Corrige plusieurs petites erreurs de français
</commit_message>
<xml_diff>
--- a/Seance 1 HTML CSS PHP.pptx
+++ b/Seance 1 HTML CSS PHP.pptx
@@ -29779,7 +29779,7 @@
             </a:pPr>
             <a:r>
               <a:rPr lang="fr-FR" altLang="fr-FR" dirty="0"/>
-              <a:t>Les balises peuvent être imbriqué, vous pouvez mettre une balise dans une autre balise, la seule condition est de les refermer dans le bonne ordre : &lt;a&gt; &lt;b&gt; &lt;/b&gt; &lt;/a&gt;</a:t>
+              <a:t>Les balises peuvent être imbriquées, vous pouvez mettre une balise dans une autre balise, la seule condition est de les refermer dans le bonne ordre : &lt;a&gt; &lt;b&gt; &lt;/b&gt; &lt;/a&gt;</a:t>
             </a:r>
           </a:p>
           <a:p>
@@ -30411,7 +30411,7 @@
             </a:pPr>
             <a:r>
               <a:rPr lang="fr-FR" altLang="fr-FR" dirty="0"/>
-              <a:t>L’élément &lt;/br&gt; : Elément orphelins, définit un retour à la ligne</a:t>
+              <a:t>L’élément &lt;/br&gt; : Elément orphelin, définit un retour à la ligne</a:t>
             </a:r>
           </a:p>
           <a:p>
@@ -37993,7 +37993,7 @@
               <a:buChar char="•"/>
             </a:pPr>
             <a:r>
-              <a:rPr lang="en-US" altLang="fr-FR" sz="2800" b="1" dirty="0">
+              <a:rPr lang="fr-FR" altLang="fr-FR" sz="2800" b="1" dirty="0">
                 <a:solidFill>
                   <a:srgbClr val="FFFFFF"/>
                 </a:solidFill>
@@ -38002,7 +38002,7 @@
               <a:t>H</a:t>
             </a:r>
             <a:r>
-              <a:rPr lang="en-US" altLang="fr-FR" sz="2800" dirty="0">
+              <a:rPr lang="fr-FR" altLang="fr-FR" sz="2800" dirty="0">
                 <a:solidFill>
                   <a:srgbClr val="FFFFFF"/>
                 </a:solidFill>
@@ -38011,7 +38011,7 @@
               <a:t>yper </a:t>
             </a:r>
             <a:r>
-              <a:rPr lang="en-US" altLang="fr-FR" sz="2800" b="1" dirty="0">
+              <a:rPr lang="fr-FR" altLang="fr-FR" sz="2800" b="1" dirty="0" err="1">
                 <a:solidFill>
                   <a:srgbClr val="FFFFFF"/>
                 </a:solidFill>
@@ -38020,16 +38020,25 @@
               <a:t>T</a:t>
             </a:r>
             <a:r>
-              <a:rPr lang="en-US" altLang="fr-FR" sz="2800" dirty="0">
+              <a:rPr lang="fr-FR" altLang="fr-FR" sz="2800" dirty="0" err="1">
                 <a:solidFill>
                   <a:srgbClr val="FFFFFF"/>
                 </a:solidFill>
                 <a:latin typeface="Calibri" panose="020F0502020204030204" pitchFamily="34" charset="0"/>
               </a:rPr>
-              <a:t>ext </a:t>
-            </a:r>
-            <a:r>
-              <a:rPr lang="en-US" altLang="fr-FR" sz="2800" b="1" dirty="0">
+              <a:t>ext</a:t>
+            </a:r>
+            <a:r>
+              <a:rPr lang="fr-FR" altLang="fr-FR" sz="2800" dirty="0">
+                <a:solidFill>
+                  <a:srgbClr val="FFFFFF"/>
+                </a:solidFill>
+                <a:latin typeface="Calibri" panose="020F0502020204030204" pitchFamily="34" charset="0"/>
+              </a:rPr>
+              <a:t> </a:t>
+            </a:r>
+            <a:r>
+              <a:rPr lang="fr-FR" altLang="fr-FR" sz="2800" b="1" dirty="0">
                 <a:solidFill>
                   <a:srgbClr val="FFFFFF"/>
                 </a:solidFill>
@@ -38038,7 +38047,7 @@
               <a:t>M</a:t>
             </a:r>
             <a:r>
-              <a:rPr lang="en-US" altLang="fr-FR" sz="2800" dirty="0">
+              <a:rPr lang="fr-FR" altLang="fr-FR" sz="2800" dirty="0">
                 <a:solidFill>
                   <a:srgbClr val="FFFFFF"/>
                 </a:solidFill>
@@ -38047,7 +38056,7 @@
               <a:t>arkup </a:t>
             </a:r>
             <a:r>
-              <a:rPr lang="en-US" altLang="fr-FR" sz="2800" b="1" dirty="0">
+              <a:rPr lang="fr-FR" altLang="fr-FR" sz="2800" b="1" dirty="0" err="1">
                 <a:solidFill>
                   <a:srgbClr val="FFFFFF"/>
                 </a:solidFill>
@@ -38056,7 +38065,7 @@
               <a:t>L</a:t>
             </a:r>
             <a:r>
-              <a:rPr lang="en-US" altLang="fr-FR" sz="2800" dirty="0">
+              <a:rPr lang="fr-FR" altLang="fr-FR" sz="2800" dirty="0" err="1">
                 <a:solidFill>
                   <a:srgbClr val="FFFFFF"/>
                 </a:solidFill>
@@ -38064,6 +38073,12 @@
               </a:rPr>
               <a:t>anguage</a:t>
             </a:r>
+            <a:endParaRPr lang="fr-FR" altLang="fr-FR" sz="2800" dirty="0">
+              <a:solidFill>
+                <a:srgbClr val="FFFFFF"/>
+              </a:solidFill>
+              <a:latin typeface="Calibri" panose="020F0502020204030204" pitchFamily="34" charset="0"/>
+            </a:endParaRPr>
           </a:p>
           <a:p>
             <a:pPr eaLnBrk="1" hangingPunct="1">
@@ -38083,92 +38098,14 @@
               <a:buChar char="•"/>
             </a:pPr>
             <a:r>
-              <a:rPr lang="en-US" altLang="fr-FR" sz="2800" dirty="0" err="1">
+              <a:rPr lang="fr-FR" altLang="fr-FR" sz="2800" dirty="0">
                 <a:solidFill>
                   <a:srgbClr val="FFFFFF"/>
                 </a:solidFill>
                 <a:latin typeface="Calibri" panose="020F0502020204030204" pitchFamily="34" charset="0"/>
               </a:rPr>
-              <a:t>Langage</a:t>
-            </a:r>
-            <a:r>
-              <a:rPr lang="en-US" altLang="fr-FR" sz="2800" dirty="0">
-                <a:solidFill>
-                  <a:srgbClr val="FFFFFF"/>
-                </a:solidFill>
-                <a:latin typeface="Calibri" panose="020F0502020204030204" pitchFamily="34" charset="0"/>
-              </a:rPr>
-              <a:t> </a:t>
-            </a:r>
-            <a:r>
-              <a:rPr lang="en-US" altLang="fr-FR" sz="2800" dirty="0" err="1">
-                <a:solidFill>
-                  <a:srgbClr val="FFFFFF"/>
-                </a:solidFill>
-                <a:latin typeface="Calibri" panose="020F0502020204030204" pitchFamily="34" charset="0"/>
-              </a:rPr>
-              <a:t>descriptif</a:t>
-            </a:r>
-            <a:r>
-              <a:rPr lang="en-US" altLang="fr-FR" sz="2800" dirty="0">
-                <a:solidFill>
-                  <a:srgbClr val="FFFFFF"/>
-                </a:solidFill>
-                <a:latin typeface="Calibri" panose="020F0502020204030204" pitchFamily="34" charset="0"/>
-              </a:rPr>
-              <a:t>, </a:t>
-            </a:r>
-            <a:r>
-              <a:rPr lang="en-US" altLang="fr-FR" sz="2800" dirty="0" err="1">
-                <a:solidFill>
-                  <a:srgbClr val="FFFFFF"/>
-                </a:solidFill>
-                <a:latin typeface="Calibri" panose="020F0502020204030204" pitchFamily="34" charset="0"/>
-              </a:rPr>
-              <a:t>balisé</a:t>
-            </a:r>
-            <a:r>
-              <a:rPr lang="en-US" altLang="fr-FR" sz="2800" dirty="0">
-                <a:solidFill>
-                  <a:srgbClr val="FFFFFF"/>
-                </a:solidFill>
-                <a:latin typeface="Calibri" panose="020F0502020204030204" pitchFamily="34" charset="0"/>
-              </a:rPr>
-              <a:t>, et </a:t>
-            </a:r>
-            <a:r>
-              <a:rPr lang="en-US" altLang="fr-FR" sz="2800" dirty="0" err="1">
-                <a:solidFill>
-                  <a:srgbClr val="FFFFFF"/>
-                </a:solidFill>
-                <a:latin typeface="Calibri" panose="020F0502020204030204" pitchFamily="34" charset="0"/>
-              </a:rPr>
-              <a:t>interprété</a:t>
-            </a:r>
-            <a:r>
-              <a:rPr lang="en-US" altLang="fr-FR" sz="2800" dirty="0">
-                <a:solidFill>
-                  <a:srgbClr val="FFFFFF"/>
-                </a:solidFill>
-                <a:latin typeface="Calibri" panose="020F0502020204030204" pitchFamily="34" charset="0"/>
-              </a:rPr>
-              <a:t> par le </a:t>
-            </a:r>
-            <a:r>
-              <a:rPr lang="en-US" altLang="fr-FR" sz="2800" dirty="0" err="1">
-                <a:solidFill>
-                  <a:srgbClr val="FFFFFF"/>
-                </a:solidFill>
-                <a:latin typeface="Calibri" panose="020F0502020204030204" pitchFamily="34" charset="0"/>
-              </a:rPr>
-              <a:t>navigateur</a:t>
-            </a:r>
-            <a:endParaRPr lang="en-US" altLang="fr-FR" sz="2800" dirty="0">
-              <a:solidFill>
-                <a:srgbClr val="FFFFFF"/>
-              </a:solidFill>
-              <a:latin typeface="Calibri" panose="020F0502020204030204" pitchFamily="34" charset="0"/>
-            </a:endParaRPr>
+              <a:t>Langage descriptif, balisé, et interprété par le navigateur</a:t>
+            </a:r>
           </a:p>
           <a:p>
             <a:pPr eaLnBrk="1" hangingPunct="1">
@@ -38188,85 +38125,13 @@
               <a:buChar char="•"/>
             </a:pPr>
             <a:r>
-              <a:rPr lang="en-US" altLang="fr-FR" sz="2800" dirty="0">
+              <a:rPr lang="fr-FR" altLang="fr-FR" sz="2800" dirty="0">
                 <a:solidFill>
                   <a:srgbClr val="FFFFFF"/>
                 </a:solidFill>
                 <a:latin typeface="Calibri" panose="020F0502020204030204" pitchFamily="34" charset="0"/>
               </a:rPr>
-              <a:t>Une page HTML </a:t>
-            </a:r>
-            <a:r>
-              <a:rPr lang="en-US" altLang="fr-FR" sz="2800" dirty="0" err="1">
-                <a:solidFill>
-                  <a:srgbClr val="FFFFFF"/>
-                </a:solidFill>
-                <a:latin typeface="Calibri" panose="020F0502020204030204" pitchFamily="34" charset="0"/>
-              </a:rPr>
-              <a:t>n'est</a:t>
-            </a:r>
-            <a:r>
-              <a:rPr lang="en-US" altLang="fr-FR" sz="2800" dirty="0">
-                <a:solidFill>
-                  <a:srgbClr val="FFFFFF"/>
-                </a:solidFill>
-                <a:latin typeface="Calibri" panose="020F0502020204030204" pitchFamily="34" charset="0"/>
-              </a:rPr>
-              <a:t> </a:t>
-            </a:r>
-            <a:r>
-              <a:rPr lang="en-US" altLang="fr-FR" sz="2800" dirty="0" err="1">
-                <a:solidFill>
-                  <a:srgbClr val="FFFFFF"/>
-                </a:solidFill>
-                <a:latin typeface="Calibri" panose="020F0502020204030204" pitchFamily="34" charset="0"/>
-              </a:rPr>
-              <a:t>rien</a:t>
-            </a:r>
-            <a:r>
-              <a:rPr lang="en-US" altLang="fr-FR" sz="2800" dirty="0">
-                <a:solidFill>
-                  <a:srgbClr val="FFFFFF"/>
-                </a:solidFill>
-                <a:latin typeface="Calibri" panose="020F0502020204030204" pitchFamily="34" charset="0"/>
-              </a:rPr>
-              <a:t> </a:t>
-            </a:r>
-            <a:r>
-              <a:rPr lang="en-US" altLang="fr-FR" sz="2800" dirty="0" err="1">
-                <a:solidFill>
-                  <a:srgbClr val="FFFFFF"/>
-                </a:solidFill>
-                <a:latin typeface="Calibri" panose="020F0502020204030204" pitchFamily="34" charset="0"/>
-              </a:rPr>
-              <a:t>d'autre</a:t>
-            </a:r>
-            <a:r>
-              <a:rPr lang="en-US" altLang="fr-FR" sz="2800" dirty="0">
-                <a:solidFill>
-                  <a:srgbClr val="FFFFFF"/>
-                </a:solidFill>
-                <a:latin typeface="Calibri" panose="020F0502020204030204" pitchFamily="34" charset="0"/>
-              </a:rPr>
-              <a:t> que du </a:t>
-            </a:r>
-            <a:r>
-              <a:rPr lang="en-US" altLang="fr-FR" sz="2800" dirty="0" err="1">
-                <a:solidFill>
-                  <a:srgbClr val="FFFFFF"/>
-                </a:solidFill>
-                <a:latin typeface="Calibri" panose="020F0502020204030204" pitchFamily="34" charset="0"/>
-              </a:rPr>
-              <a:t>texte</a:t>
-            </a:r>
-            <a:r>
-              <a:rPr lang="en-US" altLang="fr-FR" sz="2800" dirty="0">
-                <a:solidFill>
-                  <a:srgbClr val="FFFFFF"/>
-                </a:solidFill>
-                <a:latin typeface="Calibri" panose="020F0502020204030204" pitchFamily="34" charset="0"/>
-              </a:rPr>
-              <a:t>.</a:t>
+              <a:t>Une page HTML n'est rien d'autre que du texte.</a:t>
             </a:r>
           </a:p>
         </p:txBody>
@@ -38897,76 +38762,13 @@
               <a:buChar char="•"/>
             </a:pPr>
             <a:r>
-              <a:rPr lang="en-US" altLang="fr-FR" sz="2800" dirty="0" err="1">
+              <a:rPr lang="fr-FR" altLang="fr-FR" sz="2800" dirty="0">
                 <a:solidFill>
                   <a:srgbClr val="FFFFFF"/>
                 </a:solidFill>
                 <a:latin typeface="Calibri" panose="020F0502020204030204" pitchFamily="34" charset="0"/>
               </a:rPr>
-              <a:t>Je</a:t>
-            </a:r>
-            <a:r>
-              <a:rPr lang="en-US" altLang="fr-FR" sz="2800" dirty="0">
-                <a:solidFill>
-                  <a:srgbClr val="FFFFFF"/>
-                </a:solidFill>
-                <a:latin typeface="Calibri" panose="020F0502020204030204" pitchFamily="34" charset="0"/>
-              </a:rPr>
-              <a:t> </a:t>
-            </a:r>
-            <a:r>
-              <a:rPr lang="en-US" altLang="fr-FR" sz="2800" dirty="0" err="1">
-                <a:solidFill>
-                  <a:srgbClr val="FFFFFF"/>
-                </a:solidFill>
-                <a:latin typeface="Calibri" panose="020F0502020204030204" pitchFamily="34" charset="0"/>
-              </a:rPr>
-              <a:t>préfère</a:t>
-            </a:r>
-            <a:r>
-              <a:rPr lang="en-US" altLang="fr-FR" sz="2800" dirty="0">
-                <a:solidFill>
-                  <a:srgbClr val="FFFFFF"/>
-                </a:solidFill>
-                <a:latin typeface="Calibri" panose="020F0502020204030204" pitchFamily="34" charset="0"/>
-              </a:rPr>
-              <a:t> faire mon site sur </a:t>
-            </a:r>
-            <a:r>
-              <a:rPr lang="en-US" altLang="fr-FR" sz="2800" dirty="0" err="1">
-                <a:solidFill>
-                  <a:srgbClr val="FFFFFF"/>
-                </a:solidFill>
-                <a:latin typeface="Calibri" panose="020F0502020204030204" pitchFamily="34" charset="0"/>
-              </a:rPr>
-              <a:t>Wordpress</a:t>
-            </a:r>
-            <a:r>
-              <a:rPr lang="en-US" altLang="fr-FR" sz="2800" dirty="0">
-                <a:solidFill>
-                  <a:srgbClr val="FFFFFF"/>
-                </a:solidFill>
-                <a:latin typeface="Calibri" panose="020F0502020204030204" pitchFamily="34" charset="0"/>
-              </a:rPr>
-              <a:t>, </a:t>
-            </a:r>
-            <a:r>
-              <a:rPr lang="en-US" altLang="fr-FR" sz="2800" dirty="0" err="1">
-                <a:solidFill>
-                  <a:srgbClr val="FFFFFF"/>
-                </a:solidFill>
-                <a:latin typeface="Calibri" panose="020F0502020204030204" pitchFamily="34" charset="0"/>
-              </a:rPr>
-              <a:t>c'est</a:t>
-            </a:r>
-            <a:r>
-              <a:rPr lang="en-US" altLang="fr-FR" sz="2800" dirty="0">
-                <a:solidFill>
-                  <a:srgbClr val="FFFFFF"/>
-                </a:solidFill>
-                <a:latin typeface="Calibri" panose="020F0502020204030204" pitchFamily="34" charset="0"/>
-              </a:rPr>
-              <a:t> plus simple</a:t>
+              <a:t>Je préfère faire mon site sur Wordpress, c'est plus simple</a:t>
             </a:r>
           </a:p>
           <a:p>
@@ -38987,110 +38789,14 @@
               <a:buChar char="•"/>
             </a:pPr>
             <a:r>
-              <a:rPr lang="en-US" altLang="fr-FR" sz="2800" dirty="0" err="1">
+              <a:rPr lang="fr-FR" altLang="fr-FR" sz="2800" dirty="0">
                 <a:solidFill>
                   <a:srgbClr val="FFFFFF"/>
                 </a:solidFill>
                 <a:latin typeface="Calibri" panose="020F0502020204030204" pitchFamily="34" charset="0"/>
               </a:rPr>
-              <a:t>Je</a:t>
-            </a:r>
-            <a:r>
-              <a:rPr lang="en-US" altLang="fr-FR" sz="2800" dirty="0">
-                <a:solidFill>
-                  <a:srgbClr val="FFFFFF"/>
-                </a:solidFill>
-                <a:latin typeface="Calibri" panose="020F0502020204030204" pitchFamily="34" charset="0"/>
-              </a:rPr>
-              <a:t> </a:t>
-            </a:r>
-            <a:r>
-              <a:rPr lang="en-US" altLang="fr-FR" sz="2800" dirty="0" err="1">
-                <a:solidFill>
-                  <a:srgbClr val="FFFFFF"/>
-                </a:solidFill>
-                <a:latin typeface="Calibri" panose="020F0502020204030204" pitchFamily="34" charset="0"/>
-              </a:rPr>
-              <a:t>préfère</a:t>
-            </a:r>
-            <a:r>
-              <a:rPr lang="en-US" altLang="fr-FR" sz="2800" dirty="0">
-                <a:solidFill>
-                  <a:srgbClr val="FFFFFF"/>
-                </a:solidFill>
-                <a:latin typeface="Calibri" panose="020F0502020204030204" pitchFamily="34" charset="0"/>
-              </a:rPr>
-              <a:t> </a:t>
-            </a:r>
-            <a:r>
-              <a:rPr lang="en-US" altLang="fr-FR" sz="2800" dirty="0" err="1">
-                <a:solidFill>
-                  <a:srgbClr val="FFFFFF"/>
-                </a:solidFill>
-                <a:latin typeface="Calibri" panose="020F0502020204030204" pitchFamily="34" charset="0"/>
-              </a:rPr>
-              <a:t>utliser</a:t>
-            </a:r>
-            <a:r>
-              <a:rPr lang="en-US" altLang="fr-FR" sz="2800" dirty="0">
-                <a:solidFill>
-                  <a:srgbClr val="FFFFFF"/>
-                </a:solidFill>
-                <a:latin typeface="Calibri" panose="020F0502020204030204" pitchFamily="34" charset="0"/>
-              </a:rPr>
-              <a:t> un </a:t>
-            </a:r>
-            <a:r>
-              <a:rPr lang="en-US" altLang="fr-FR" sz="2800" dirty="0" err="1">
-                <a:solidFill>
-                  <a:srgbClr val="FFFFFF"/>
-                </a:solidFill>
-                <a:latin typeface="Calibri" panose="020F0502020204030204" pitchFamily="34" charset="0"/>
-              </a:rPr>
-              <a:t>editeur</a:t>
-            </a:r>
-            <a:r>
-              <a:rPr lang="en-US" altLang="fr-FR" sz="2800" dirty="0">
-                <a:solidFill>
-                  <a:srgbClr val="FFFFFF"/>
-                </a:solidFill>
-                <a:latin typeface="Calibri" panose="020F0502020204030204" pitchFamily="34" charset="0"/>
-              </a:rPr>
-              <a:t> WYSIWIG, </a:t>
-            </a:r>
-            <a:r>
-              <a:rPr lang="en-US" altLang="fr-FR" sz="2800" dirty="0" err="1">
-                <a:solidFill>
-                  <a:srgbClr val="FFFFFF"/>
-                </a:solidFill>
-                <a:latin typeface="Calibri" panose="020F0502020204030204" pitchFamily="34" charset="0"/>
-              </a:rPr>
-              <a:t>il</a:t>
-            </a:r>
-            <a:r>
-              <a:rPr lang="en-US" altLang="fr-FR" sz="2800" dirty="0">
-                <a:solidFill>
-                  <a:srgbClr val="FFFFFF"/>
-                </a:solidFill>
-                <a:latin typeface="Calibri" panose="020F0502020204030204" pitchFamily="34" charset="0"/>
-              </a:rPr>
-              <a:t> fait tout pour </a:t>
-            </a:r>
-            <a:r>
-              <a:rPr lang="en-US" altLang="fr-FR" sz="2800" dirty="0" err="1">
-                <a:solidFill>
-                  <a:srgbClr val="FFFFFF"/>
-                </a:solidFill>
-                <a:latin typeface="Calibri" panose="020F0502020204030204" pitchFamily="34" charset="0"/>
-              </a:rPr>
-              <a:t>moi</a:t>
-            </a:r>
-            <a:endParaRPr lang="en-US" altLang="fr-FR" sz="2800" dirty="0">
-              <a:solidFill>
-                <a:srgbClr val="FFFFFF"/>
-              </a:solidFill>
-              <a:latin typeface="Calibri" panose="020F0502020204030204" pitchFamily="34" charset="0"/>
-            </a:endParaRPr>
+              <a:t>Je préfère utiliser un éditeur WYSIWIG, il fait tout pour moi</a:t>
+            </a:r>
           </a:p>
           <a:p>
             <a:pPr eaLnBrk="1" hangingPunct="1">
@@ -39110,166 +38816,13 @@
               <a:buChar char="•"/>
             </a:pPr>
             <a:r>
-              <a:rPr lang="en-US" altLang="fr-FR" sz="2800" dirty="0" err="1">
+              <a:rPr lang="fr-FR" altLang="fr-FR" sz="2800" dirty="0">
                 <a:solidFill>
                   <a:srgbClr val="FFFFFF"/>
                 </a:solidFill>
                 <a:latin typeface="Calibri" panose="020F0502020204030204" pitchFamily="34" charset="0"/>
               </a:rPr>
-              <a:t>Je</a:t>
-            </a:r>
-            <a:r>
-              <a:rPr lang="en-US" altLang="fr-FR" sz="2800" dirty="0">
-                <a:solidFill>
-                  <a:srgbClr val="FFFFFF"/>
-                </a:solidFill>
-                <a:latin typeface="Calibri" panose="020F0502020204030204" pitchFamily="34" charset="0"/>
-              </a:rPr>
-              <a:t> </a:t>
-            </a:r>
-            <a:r>
-              <a:rPr lang="en-US" altLang="fr-FR" sz="2800" dirty="0" err="1">
-                <a:solidFill>
-                  <a:srgbClr val="FFFFFF"/>
-                </a:solidFill>
-                <a:latin typeface="Calibri" panose="020F0502020204030204" pitchFamily="34" charset="0"/>
-              </a:rPr>
-              <a:t>vais</a:t>
-            </a:r>
-            <a:r>
-              <a:rPr lang="en-US" altLang="fr-FR" sz="2800" dirty="0">
-                <a:solidFill>
-                  <a:srgbClr val="FFFFFF"/>
-                </a:solidFill>
-                <a:latin typeface="Calibri" panose="020F0502020204030204" pitchFamily="34" charset="0"/>
-              </a:rPr>
-              <a:t> </a:t>
-            </a:r>
-            <a:r>
-              <a:rPr lang="en-US" altLang="fr-FR" sz="2800" dirty="0" err="1">
-                <a:solidFill>
-                  <a:srgbClr val="FFFFFF"/>
-                </a:solidFill>
-                <a:latin typeface="Calibri" panose="020F0502020204030204" pitchFamily="34" charset="0"/>
-              </a:rPr>
-              <a:t>contacter</a:t>
-            </a:r>
-            <a:r>
-              <a:rPr lang="en-US" altLang="fr-FR" sz="2800" dirty="0">
-                <a:solidFill>
-                  <a:srgbClr val="FFFFFF"/>
-                </a:solidFill>
-                <a:latin typeface="Calibri" panose="020F0502020204030204" pitchFamily="34" charset="0"/>
-              </a:rPr>
-              <a:t> </a:t>
-            </a:r>
-            <a:r>
-              <a:rPr lang="en-US" altLang="fr-FR" sz="2800" dirty="0" err="1">
-                <a:solidFill>
-                  <a:srgbClr val="FFFFFF"/>
-                </a:solidFill>
-                <a:latin typeface="Calibri" panose="020F0502020204030204" pitchFamily="34" charset="0"/>
-              </a:rPr>
-              <a:t>une</a:t>
-            </a:r>
-            <a:r>
-              <a:rPr lang="en-US" altLang="fr-FR" sz="2800" dirty="0">
-                <a:solidFill>
-                  <a:srgbClr val="FFFFFF"/>
-                </a:solidFill>
-                <a:latin typeface="Calibri" panose="020F0502020204030204" pitchFamily="34" charset="0"/>
-              </a:rPr>
-              <a:t> </a:t>
-            </a:r>
-            <a:r>
-              <a:rPr lang="en-US" altLang="fr-FR" sz="2800" dirty="0" err="1">
-                <a:solidFill>
-                  <a:srgbClr val="FFFFFF"/>
-                </a:solidFill>
-                <a:latin typeface="Calibri" panose="020F0502020204030204" pitchFamily="34" charset="0"/>
-              </a:rPr>
-              <a:t>société</a:t>
-            </a:r>
-            <a:r>
-              <a:rPr lang="en-US" altLang="fr-FR" sz="2800" dirty="0">
-                <a:solidFill>
-                  <a:srgbClr val="FFFFFF"/>
-                </a:solidFill>
-                <a:latin typeface="Calibri" panose="020F0502020204030204" pitchFamily="34" charset="0"/>
-              </a:rPr>
-              <a:t>, </a:t>
-            </a:r>
-            <a:r>
-              <a:rPr lang="en-US" altLang="fr-FR" sz="2800" dirty="0" err="1">
-                <a:solidFill>
-                  <a:srgbClr val="FFFFFF"/>
-                </a:solidFill>
-                <a:latin typeface="Calibri" panose="020F0502020204030204" pitchFamily="34" charset="0"/>
-              </a:rPr>
-              <a:t>elle</a:t>
-            </a:r>
-            <a:r>
-              <a:rPr lang="en-US" altLang="fr-FR" sz="2800" dirty="0">
-                <a:solidFill>
-                  <a:srgbClr val="FFFFFF"/>
-                </a:solidFill>
-                <a:latin typeface="Calibri" panose="020F0502020204030204" pitchFamily="34" charset="0"/>
-              </a:rPr>
-              <a:t> </a:t>
-            </a:r>
-            <a:r>
-              <a:rPr lang="en-US" altLang="fr-FR" sz="2800" dirty="0" err="1">
-                <a:solidFill>
-                  <a:srgbClr val="FFFFFF"/>
-                </a:solidFill>
-                <a:latin typeface="Calibri" panose="020F0502020204030204" pitchFamily="34" charset="0"/>
-              </a:rPr>
-              <a:t>est</a:t>
-            </a:r>
-            <a:r>
-              <a:rPr lang="en-US" altLang="fr-FR" sz="2800" dirty="0">
-                <a:solidFill>
-                  <a:srgbClr val="FFFFFF"/>
-                </a:solidFill>
-                <a:latin typeface="Calibri" panose="020F0502020204030204" pitchFamily="34" charset="0"/>
-              </a:rPr>
-              <a:t> </a:t>
-            </a:r>
-            <a:r>
-              <a:rPr lang="en-US" altLang="fr-FR" sz="2800" dirty="0" err="1">
-                <a:solidFill>
-                  <a:srgbClr val="FFFFFF"/>
-                </a:solidFill>
-                <a:latin typeface="Calibri" panose="020F0502020204030204" pitchFamily="34" charset="0"/>
-              </a:rPr>
-              <a:t>spécialisé</a:t>
-            </a:r>
-            <a:r>
-              <a:rPr lang="en-US" altLang="fr-FR" sz="2800" dirty="0">
-                <a:solidFill>
-                  <a:srgbClr val="FFFFFF"/>
-                </a:solidFill>
-                <a:latin typeface="Calibri" panose="020F0502020204030204" pitchFamily="34" charset="0"/>
-              </a:rPr>
-              <a:t> et </a:t>
-            </a:r>
-            <a:r>
-              <a:rPr lang="en-US" altLang="fr-FR" sz="2800" dirty="0" err="1">
-                <a:solidFill>
-                  <a:srgbClr val="FFFFFF"/>
-                </a:solidFill>
-                <a:latin typeface="Calibri" panose="020F0502020204030204" pitchFamily="34" charset="0"/>
-              </a:rPr>
-              <a:t>fera</a:t>
-            </a:r>
-            <a:r>
-              <a:rPr lang="en-US" altLang="fr-FR" sz="2800" dirty="0">
-                <a:solidFill>
-                  <a:srgbClr val="FFFFFF"/>
-                </a:solidFill>
-                <a:latin typeface="Calibri" panose="020F0502020204030204" pitchFamily="34" charset="0"/>
-              </a:rPr>
-              <a:t> tout à ma place</a:t>
+              <a:t>Je vais contacter une société, elle est spécialisé et fera tout à ma place</a:t>
             </a:r>
           </a:p>
           <a:p>
@@ -39290,67 +38843,13 @@
               <a:buChar char="•"/>
             </a:pPr>
             <a:r>
-              <a:rPr lang="en-US" altLang="fr-FR" sz="2800" dirty="0">
+              <a:rPr lang="fr-FR" altLang="fr-FR" sz="2800" dirty="0">
                 <a:solidFill>
                   <a:srgbClr val="FFFFFF"/>
                 </a:solidFill>
                 <a:latin typeface="Calibri" panose="020F0502020204030204" pitchFamily="34" charset="0"/>
               </a:rPr>
-              <a:t>… </a:t>
-            </a:r>
-            <a:r>
-              <a:rPr lang="en-US" altLang="fr-FR" sz="2800" dirty="0" err="1">
-                <a:solidFill>
-                  <a:srgbClr val="FFFFFF"/>
-                </a:solidFill>
-                <a:latin typeface="Calibri" panose="020F0502020204030204" pitchFamily="34" charset="0"/>
-              </a:rPr>
-              <a:t>Vous</a:t>
-            </a:r>
-            <a:r>
-              <a:rPr lang="en-US" altLang="fr-FR" sz="2800" dirty="0">
-                <a:solidFill>
-                  <a:srgbClr val="FFFFFF"/>
-                </a:solidFill>
-                <a:latin typeface="Calibri" panose="020F0502020204030204" pitchFamily="34" charset="0"/>
-              </a:rPr>
-              <a:t> </a:t>
-            </a:r>
-            <a:r>
-              <a:rPr lang="en-US" altLang="fr-FR" sz="2800" dirty="0" err="1">
-                <a:solidFill>
-                  <a:srgbClr val="FFFFFF"/>
-                </a:solidFill>
-                <a:latin typeface="Calibri" panose="020F0502020204030204" pitchFamily="34" charset="0"/>
-              </a:rPr>
-              <a:t>en</a:t>
-            </a:r>
-            <a:r>
-              <a:rPr lang="en-US" altLang="fr-FR" sz="2800" dirty="0">
-                <a:solidFill>
-                  <a:srgbClr val="FFFFFF"/>
-                </a:solidFill>
-                <a:latin typeface="Calibri" panose="020F0502020204030204" pitchFamily="34" charset="0"/>
-              </a:rPr>
-              <a:t> </a:t>
-            </a:r>
-            <a:r>
-              <a:rPr lang="en-US" altLang="fr-FR" sz="2800" dirty="0" err="1">
-                <a:solidFill>
-                  <a:srgbClr val="FFFFFF"/>
-                </a:solidFill>
-                <a:latin typeface="Calibri" panose="020F0502020204030204" pitchFamily="34" charset="0"/>
-              </a:rPr>
-              <a:t>pensez</a:t>
-            </a:r>
-            <a:r>
-              <a:rPr lang="en-US" altLang="fr-FR" sz="2800" dirty="0">
-                <a:solidFill>
-                  <a:srgbClr val="FFFFFF"/>
-                </a:solidFill>
-                <a:latin typeface="Calibri" panose="020F0502020204030204" pitchFamily="34" charset="0"/>
-              </a:rPr>
-              <a:t> quoi ? </a:t>
+              <a:t>… Vous en pensez quoi ? </a:t>
             </a:r>
           </a:p>
         </p:txBody>
@@ -39845,92 +39344,14 @@
               <a:buChar char="•"/>
             </a:pPr>
             <a:r>
-              <a:rPr lang="en-US" altLang="fr-FR" sz="2800" dirty="0" err="1">
+              <a:rPr lang="fr-FR" altLang="fr-FR" sz="2800" dirty="0">
                 <a:solidFill>
                   <a:srgbClr val="FFFFFF"/>
                 </a:solidFill>
                 <a:latin typeface="Calibri" panose="020F0502020204030204" pitchFamily="34" charset="0"/>
               </a:rPr>
-              <a:t>Créé</a:t>
-            </a:r>
-            <a:r>
-              <a:rPr lang="en-US" altLang="fr-FR" sz="2800" dirty="0">
-                <a:solidFill>
-                  <a:srgbClr val="FFFFFF"/>
-                </a:solidFill>
-                <a:latin typeface="Calibri" panose="020F0502020204030204" pitchFamily="34" charset="0"/>
-              </a:rPr>
-              <a:t> </a:t>
-            </a:r>
-            <a:r>
-              <a:rPr lang="en-US" altLang="fr-FR" sz="2800" dirty="0" err="1">
-                <a:solidFill>
-                  <a:srgbClr val="FFFFFF"/>
-                </a:solidFill>
-                <a:latin typeface="Calibri" panose="020F0502020204030204" pitchFamily="34" charset="0"/>
-              </a:rPr>
-              <a:t>en</a:t>
-            </a:r>
-            <a:r>
-              <a:rPr lang="en-US" altLang="fr-FR" sz="2800" dirty="0">
-                <a:solidFill>
-                  <a:srgbClr val="FFFFFF"/>
-                </a:solidFill>
-                <a:latin typeface="Calibri" panose="020F0502020204030204" pitchFamily="34" charset="0"/>
-              </a:rPr>
-              <a:t> 1991, le but premier </a:t>
-            </a:r>
-            <a:r>
-              <a:rPr lang="en-US" altLang="fr-FR" sz="2800" dirty="0" err="1">
-                <a:solidFill>
-                  <a:srgbClr val="FFFFFF"/>
-                </a:solidFill>
-                <a:latin typeface="Calibri" panose="020F0502020204030204" pitchFamily="34" charset="0"/>
-              </a:rPr>
-              <a:t>était</a:t>
-            </a:r>
-            <a:r>
-              <a:rPr lang="en-US" altLang="fr-FR" sz="2800" dirty="0">
-                <a:solidFill>
-                  <a:srgbClr val="FFFFFF"/>
-                </a:solidFill>
-                <a:latin typeface="Calibri" panose="020F0502020204030204" pitchFamily="34" charset="0"/>
-              </a:rPr>
-              <a:t> de structurer des data, et de </a:t>
-            </a:r>
-            <a:r>
-              <a:rPr lang="en-US" altLang="fr-FR" sz="2800" dirty="0" err="1">
-                <a:solidFill>
-                  <a:srgbClr val="FFFFFF"/>
-                </a:solidFill>
-                <a:latin typeface="Calibri" panose="020F0502020204030204" pitchFamily="34" charset="0"/>
-              </a:rPr>
-              <a:t>leur</a:t>
-            </a:r>
-            <a:r>
-              <a:rPr lang="en-US" altLang="fr-FR" sz="2800" dirty="0">
-                <a:solidFill>
-                  <a:srgbClr val="FFFFFF"/>
-                </a:solidFill>
-                <a:latin typeface="Calibri" panose="020F0502020204030204" pitchFamily="34" charset="0"/>
-              </a:rPr>
-              <a:t> donner du </a:t>
-            </a:r>
-            <a:r>
-              <a:rPr lang="en-US" altLang="fr-FR" sz="2800" dirty="0" err="1">
-                <a:solidFill>
-                  <a:srgbClr val="FFFFFF"/>
-                </a:solidFill>
-                <a:latin typeface="Calibri" panose="020F0502020204030204" pitchFamily="34" charset="0"/>
-              </a:rPr>
-              <a:t>sens</a:t>
-            </a:r>
-            <a:endParaRPr lang="en-US" altLang="fr-FR" sz="2800" dirty="0">
-              <a:solidFill>
-                <a:srgbClr val="FFFFFF"/>
-              </a:solidFill>
-              <a:latin typeface="Calibri" panose="020F0502020204030204" pitchFamily="34" charset="0"/>
-            </a:endParaRPr>
+              <a:t>Créé en 1991, le but premier était de structurer des data, et de leur donner du sens</a:t>
+            </a:r>
           </a:p>
           <a:p>
             <a:pPr eaLnBrk="1" hangingPunct="1">
@@ -39950,121 +39371,13 @@
               <a:buChar char="•"/>
             </a:pPr>
             <a:r>
-              <a:rPr lang="en-US" altLang="fr-FR" sz="2800" dirty="0">
+              <a:rPr lang="fr-FR" altLang="fr-FR" sz="2800" dirty="0">
                 <a:solidFill>
                   <a:srgbClr val="FFFFFF"/>
                 </a:solidFill>
                 <a:latin typeface="Calibri" panose="020F0502020204030204" pitchFamily="34" charset="0"/>
               </a:rPr>
-              <a:t>On </a:t>
-            </a:r>
-            <a:r>
-              <a:rPr lang="en-US" altLang="fr-FR" sz="2800" dirty="0" err="1">
-                <a:solidFill>
-                  <a:srgbClr val="FFFFFF"/>
-                </a:solidFill>
-                <a:latin typeface="Calibri" panose="020F0502020204030204" pitchFamily="34" charset="0"/>
-              </a:rPr>
-              <a:t>ajoute</a:t>
-            </a:r>
-            <a:r>
-              <a:rPr lang="en-US" altLang="fr-FR" sz="2800" dirty="0">
-                <a:solidFill>
-                  <a:srgbClr val="FFFFFF"/>
-                </a:solidFill>
-                <a:latin typeface="Calibri" panose="020F0502020204030204" pitchFamily="34" charset="0"/>
-              </a:rPr>
-              <a:t> de </a:t>
-            </a:r>
-            <a:r>
-              <a:rPr lang="en-US" altLang="fr-FR" sz="2800" dirty="0" err="1">
-                <a:solidFill>
-                  <a:srgbClr val="FFFFFF"/>
-                </a:solidFill>
-                <a:latin typeface="Calibri" panose="020F0502020204030204" pitchFamily="34" charset="0"/>
-              </a:rPr>
-              <a:t>l'information</a:t>
-            </a:r>
-            <a:r>
-              <a:rPr lang="en-US" altLang="fr-FR" sz="2800" dirty="0">
-                <a:solidFill>
-                  <a:srgbClr val="FFFFFF"/>
-                </a:solidFill>
-                <a:latin typeface="Calibri" panose="020F0502020204030204" pitchFamily="34" charset="0"/>
-              </a:rPr>
-              <a:t> de </a:t>
-            </a:r>
-            <a:r>
-              <a:rPr lang="en-US" altLang="fr-FR" sz="2800" dirty="0" err="1">
-                <a:solidFill>
-                  <a:srgbClr val="FFFFFF"/>
-                </a:solidFill>
-                <a:latin typeface="Calibri" panose="020F0502020204030204" pitchFamily="34" charset="0"/>
-              </a:rPr>
-              <a:t>mise</a:t>
-            </a:r>
-            <a:r>
-              <a:rPr lang="en-US" altLang="fr-FR" sz="2800" dirty="0">
-                <a:solidFill>
-                  <a:srgbClr val="FFFFFF"/>
-                </a:solidFill>
-                <a:latin typeface="Calibri" panose="020F0502020204030204" pitchFamily="34" charset="0"/>
-              </a:rPr>
-              <a:t> </a:t>
-            </a:r>
-            <a:r>
-              <a:rPr lang="en-US" altLang="fr-FR" sz="2800" dirty="0" err="1">
-                <a:solidFill>
-                  <a:srgbClr val="FFFFFF"/>
-                </a:solidFill>
-                <a:latin typeface="Calibri" panose="020F0502020204030204" pitchFamily="34" charset="0"/>
-              </a:rPr>
-              <a:t>en</a:t>
-            </a:r>
-            <a:r>
-              <a:rPr lang="en-US" altLang="fr-FR" sz="2800" dirty="0">
-                <a:solidFill>
-                  <a:srgbClr val="FFFFFF"/>
-                </a:solidFill>
-                <a:latin typeface="Calibri" panose="020F0502020204030204" pitchFamily="34" charset="0"/>
-              </a:rPr>
-              <a:t> page, de </a:t>
-            </a:r>
-            <a:r>
-              <a:rPr lang="en-US" altLang="fr-FR" sz="2800" dirty="0" err="1">
-                <a:solidFill>
-                  <a:srgbClr val="FFFFFF"/>
-                </a:solidFill>
-                <a:latin typeface="Calibri" panose="020F0502020204030204" pitchFamily="34" charset="0"/>
-              </a:rPr>
-              <a:t>codage</a:t>
-            </a:r>
-            <a:r>
-              <a:rPr lang="en-US" altLang="fr-FR" sz="2800" dirty="0">
-                <a:solidFill>
-                  <a:srgbClr val="FFFFFF"/>
-                </a:solidFill>
-                <a:latin typeface="Calibri" panose="020F0502020204030204" pitchFamily="34" charset="0"/>
-              </a:rPr>
-              <a:t>, de linkage, à des </a:t>
-            </a:r>
-            <a:r>
-              <a:rPr lang="en-US" altLang="fr-FR" sz="2800" dirty="0" err="1">
-                <a:solidFill>
-                  <a:srgbClr val="FFFFFF"/>
-                </a:solidFill>
-                <a:latin typeface="Calibri" panose="020F0502020204030204" pitchFamily="34" charset="0"/>
-              </a:rPr>
-              <a:t>données</a:t>
-            </a:r>
-            <a:r>
-              <a:rPr lang="en-US" altLang="fr-FR" sz="2800" dirty="0">
-                <a:solidFill>
-                  <a:srgbClr val="FFFFFF"/>
-                </a:solidFill>
-                <a:latin typeface="Calibri" panose="020F0502020204030204" pitchFamily="34" charset="0"/>
-              </a:rPr>
-              <a:t> brutes.</a:t>
+              <a:t>On ajoute de l'information de mise en page, de codage, de linkage, à des données brutes.</a:t>
             </a:r>
           </a:p>
           <a:p>
@@ -40085,67 +39398,13 @@
               <a:buChar char="•"/>
             </a:pPr>
             <a:r>
-              <a:rPr lang="en-US" altLang="fr-FR" sz="2800" dirty="0">
+              <a:rPr lang="fr-FR" altLang="fr-FR" sz="2800" dirty="0">
                 <a:solidFill>
                   <a:srgbClr val="FFFFFF"/>
                 </a:solidFill>
                 <a:latin typeface="Calibri" panose="020F0502020204030204" pitchFamily="34" charset="0"/>
               </a:rPr>
-              <a:t>Il </a:t>
-            </a:r>
-            <a:r>
-              <a:rPr lang="en-US" altLang="fr-FR" sz="2800" dirty="0" err="1">
-                <a:solidFill>
-                  <a:srgbClr val="FFFFFF"/>
-                </a:solidFill>
-                <a:latin typeface="Calibri" panose="020F0502020204030204" pitchFamily="34" charset="0"/>
-              </a:rPr>
-              <a:t>existe</a:t>
-            </a:r>
-            <a:r>
-              <a:rPr lang="en-US" altLang="fr-FR" sz="2800" dirty="0">
-                <a:solidFill>
-                  <a:srgbClr val="FFFFFF"/>
-                </a:solidFill>
-                <a:latin typeface="Calibri" panose="020F0502020204030204" pitchFamily="34" charset="0"/>
-              </a:rPr>
-              <a:t> </a:t>
-            </a:r>
-            <a:r>
-              <a:rPr lang="en-US" altLang="fr-FR" sz="2800" dirty="0" err="1">
-                <a:solidFill>
-                  <a:srgbClr val="FFFFFF"/>
-                </a:solidFill>
-                <a:latin typeface="Calibri" panose="020F0502020204030204" pitchFamily="34" charset="0"/>
-              </a:rPr>
-              <a:t>plusieurs</a:t>
-            </a:r>
-            <a:r>
-              <a:rPr lang="en-US" altLang="fr-FR" sz="2800" dirty="0">
-                <a:solidFill>
-                  <a:srgbClr val="FFFFFF"/>
-                </a:solidFill>
-                <a:latin typeface="Calibri" panose="020F0502020204030204" pitchFamily="34" charset="0"/>
-              </a:rPr>
-              <a:t> versions </a:t>
-            </a:r>
-            <a:r>
-              <a:rPr lang="en-US" altLang="fr-FR" sz="2800" dirty="0" err="1">
-                <a:solidFill>
-                  <a:srgbClr val="FFFFFF"/>
-                </a:solidFill>
-                <a:latin typeface="Calibri" panose="020F0502020204030204" pitchFamily="34" charset="0"/>
-              </a:rPr>
-              <a:t>d'HTML</a:t>
-            </a:r>
-            <a:r>
-              <a:rPr lang="en-US" altLang="fr-FR" sz="2800" dirty="0">
-                <a:solidFill>
-                  <a:srgbClr val="FFFFFF"/>
-                </a:solidFill>
-                <a:latin typeface="Calibri" panose="020F0502020204030204" pitchFamily="34" charset="0"/>
-              </a:rPr>
-              <a:t> et CSS</a:t>
+              <a:t>Il existe plusieurs versions d'HTML et CSS</a:t>
             </a:r>
           </a:p>
           <a:p>
@@ -40165,7 +39424,7 @@
               <a:buFont typeface="Arial" panose="020B0604020202020204" pitchFamily="34" charset="0"/>
               <a:buNone/>
             </a:pPr>
-            <a:endParaRPr lang="en-US" altLang="fr-FR" sz="2800" dirty="0">
+            <a:endParaRPr lang="fr-FR" altLang="fr-FR" sz="2800" dirty="0">
               <a:solidFill>
                 <a:srgbClr val="FFFFFF"/>
               </a:solidFill>
@@ -40753,7 +40012,7 @@
               <a:defRPr/>
             </a:pPr>
             <a:r>
-              <a:rPr lang="en-US" altLang="fr-FR" dirty="0"/>
+              <a:rPr lang="fr-FR" altLang="fr-FR" dirty="0"/>
               <a:t>L'IDE</a:t>
             </a:r>
           </a:p>
@@ -40785,90 +40044,17 @@
               <a:defRPr/>
             </a:pPr>
             <a:r>
-              <a:rPr lang="en-US" altLang="fr-FR" sz="2400" dirty="0" err="1"/>
-              <a:t>Rien</a:t>
-            </a:r>
-            <a:r>
-              <a:rPr lang="en-US" altLang="fr-FR" sz="2400" dirty="0"/>
-              <a:t> </a:t>
-            </a:r>
-            <a:r>
               <a:rPr lang="fr-FR" altLang="fr-FR" sz="2400" dirty="0"/>
-              <a:t>n'est</a:t>
-            </a:r>
-            <a:r>
-              <a:rPr lang="en-US" altLang="fr-FR" sz="2400" dirty="0"/>
-              <a:t> </a:t>
+              <a:t>Rien n'est obligé ici. HTML n'étant que du texte, on peut choisir l'IDE sans contrainte, même </a:t>
+            </a:r>
+            <a:r>
+              <a:rPr lang="fr-FR" altLang="fr-FR" sz="2400" dirty="0" err="1"/>
+              <a:t>notepad</a:t>
             </a:r>
             <a:r>
               <a:rPr lang="fr-FR" altLang="fr-FR" sz="2400" dirty="0"/>
-              <a:t>obligé</a:t>
-            </a:r>
-            <a:r>
-              <a:rPr lang="en-US" altLang="fr-FR" sz="2400" dirty="0"/>
-              <a:t> ici. HTML </a:t>
-            </a:r>
-            <a:r>
-              <a:rPr lang="en-US" altLang="fr-FR" sz="2400" dirty="0" err="1"/>
-              <a:t>n'étant</a:t>
-            </a:r>
-            <a:r>
-              <a:rPr lang="en-US" altLang="fr-FR" sz="2400" dirty="0"/>
-              <a:t> que du </a:t>
-            </a:r>
-            <a:r>
-              <a:rPr lang="en-US" altLang="fr-FR" sz="2400" dirty="0" err="1"/>
-              <a:t>texte</a:t>
-            </a:r>
-            <a:r>
-              <a:rPr lang="en-US" altLang="fr-FR" sz="2400" dirty="0"/>
-              <a:t>, on </a:t>
-            </a:r>
-            <a:r>
-              <a:rPr lang="en-US" altLang="fr-FR" sz="2400" dirty="0" err="1"/>
-              <a:t>peut</a:t>
-            </a:r>
-            <a:r>
-              <a:rPr lang="en-US" altLang="fr-FR" sz="2400" dirty="0"/>
-              <a:t> </a:t>
-            </a:r>
-            <a:r>
-              <a:rPr lang="en-US" altLang="fr-FR" sz="2400" dirty="0" err="1"/>
-              <a:t>choisir</a:t>
-            </a:r>
-            <a:r>
-              <a:rPr lang="en-US" altLang="fr-FR" sz="2400" dirty="0"/>
-              <a:t> </a:t>
-            </a:r>
-            <a:r>
-              <a:rPr lang="fr-FR" altLang="fr-FR" sz="2400" dirty="0"/>
-              <a:t>l'IDE</a:t>
-            </a:r>
-            <a:r>
-              <a:rPr lang="en-US" altLang="fr-FR" sz="2400" dirty="0"/>
-              <a:t> sans </a:t>
-            </a:r>
-            <a:r>
-              <a:rPr lang="en-US" altLang="fr-FR" sz="2400" dirty="0" err="1"/>
-              <a:t>contrainte</a:t>
-            </a:r>
-            <a:r>
-              <a:rPr lang="en-US" altLang="fr-FR" sz="2400" dirty="0"/>
-              <a:t>, </a:t>
-            </a:r>
-            <a:r>
-              <a:rPr lang="en-US" altLang="fr-FR" sz="2400" dirty="0" err="1"/>
-              <a:t>même</a:t>
-            </a:r>
-            <a:r>
-              <a:rPr lang="en-US" altLang="fr-FR" sz="2400" dirty="0"/>
-              <a:t> notepad fait </a:t>
-            </a:r>
-            <a:r>
-              <a:rPr lang="en-US" altLang="fr-FR" sz="2400" dirty="0" err="1"/>
-              <a:t>l'affaire</a:t>
-            </a:r>
-            <a:endParaRPr lang="en-US" altLang="fr-FR" sz="2400" dirty="0"/>
+              <a:t> fait l'affaire</a:t>
+            </a:r>
           </a:p>
           <a:p>
             <a:pPr marL="909638" lvl="2" indent="-300038" eaLnBrk="1" hangingPunct="1">
@@ -40923,40 +40109,8 @@
               <a:defRPr/>
             </a:pPr>
             <a:r>
-              <a:rPr lang="en-US" altLang="fr-FR" dirty="0"/>
-              <a:t>Pour des raisons </a:t>
-            </a:r>
-            <a:r>
-              <a:rPr lang="en-US" altLang="fr-FR" dirty="0" err="1"/>
-              <a:t>pratiques</a:t>
-            </a:r>
-            <a:r>
-              <a:rPr lang="en-US" altLang="fr-FR" dirty="0"/>
-              <a:t>, </a:t>
-            </a:r>
-            <a:r>
-              <a:rPr lang="en-US" altLang="fr-FR" dirty="0" err="1"/>
-              <a:t>Je</a:t>
-            </a:r>
-            <a:r>
-              <a:rPr lang="en-US" altLang="fr-FR" dirty="0"/>
-              <a:t> </a:t>
-            </a:r>
-            <a:r>
-              <a:rPr lang="en-US" altLang="fr-FR" dirty="0" err="1"/>
-              <a:t>vous</a:t>
-            </a:r>
-            <a:r>
-              <a:rPr lang="en-US" altLang="fr-FR" dirty="0"/>
-              <a:t> </a:t>
-            </a:r>
-            <a:r>
-              <a:rPr lang="en-US" altLang="fr-FR" dirty="0" err="1"/>
-              <a:t>conseille</a:t>
-            </a:r>
-            <a:r>
-              <a:rPr lang="en-US" altLang="fr-FR" dirty="0"/>
-              <a:t> Visual Studio Code.</a:t>
+              <a:rPr lang="fr-FR" altLang="fr-FR" dirty="0"/>
+              <a:t>Pour des raisons pratiques, Je vous conseille Visual Studio Code.</a:t>
             </a:r>
           </a:p>
           <a:p>
@@ -40979,7 +40133,7 @@
               </a:tabLst>
               <a:defRPr/>
             </a:pPr>
-            <a:endParaRPr lang="en-US" altLang="fr-FR" sz="2400" dirty="0"/>
+            <a:endParaRPr lang="fr-FR" altLang="fr-FR" sz="2400" dirty="0"/>
           </a:p>
         </p:txBody>
       </p:sp>
@@ -41260,8 +40414,8 @@
               </a:tabLst>
             </a:pPr>
             <a:r>
-              <a:rPr lang="en-US" altLang="fr-FR" dirty="0"/>
-              <a:t>Elements : </a:t>
+              <a:rPr lang="fr-FR" altLang="fr-FR" dirty="0"/>
+              <a:t>Eléments : </a:t>
             </a:r>
           </a:p>
           <a:p>
@@ -41294,36 +40448,8 @@
               </a:tabLst>
             </a:pPr>
             <a:r>
-              <a:rPr lang="en-US" altLang="fr-FR" sz="2800" dirty="0" err="1"/>
-              <a:t>Définissent</a:t>
-            </a:r>
-            <a:r>
-              <a:rPr lang="en-US" altLang="fr-FR" sz="2800" dirty="0"/>
-              <a:t> des </a:t>
-            </a:r>
-            <a:r>
-              <a:rPr lang="en-US" altLang="fr-FR" sz="2800" dirty="0" err="1"/>
-              <a:t>objet</a:t>
-            </a:r>
-            <a:r>
-              <a:rPr lang="en-US" altLang="fr-FR" sz="2800" dirty="0"/>
-              <a:t> </a:t>
-            </a:r>
-            <a:r>
-              <a:rPr lang="en-US" altLang="fr-FR" sz="2800" dirty="0" err="1"/>
-              <a:t>dans</a:t>
-            </a:r>
-            <a:r>
-              <a:rPr lang="en-US" altLang="fr-FR" sz="2800" dirty="0"/>
-              <a:t> </a:t>
-            </a:r>
-            <a:r>
-              <a:rPr lang="en-US" altLang="fr-FR" sz="2800" dirty="0" err="1"/>
-              <a:t>notre</a:t>
-            </a:r>
-            <a:r>
-              <a:rPr lang="en-US" altLang="fr-FR" sz="2800" dirty="0"/>
-              <a:t> page web</a:t>
+              <a:rPr lang="fr-FR" altLang="fr-FR" sz="2800" dirty="0"/>
+              <a:t>Définissent des objet dans notre page web</a:t>
             </a:r>
           </a:p>
           <a:p>
@@ -41356,24 +40482,8 @@
               </a:tabLst>
             </a:pPr>
             <a:r>
-              <a:rPr lang="en-US" altLang="fr-FR" sz="2800" dirty="0"/>
-              <a:t>p </a:t>
-            </a:r>
-            <a:r>
-              <a:rPr lang="en-US" altLang="fr-FR" sz="2800" dirty="0" err="1"/>
-              <a:t>définit</a:t>
-            </a:r>
-            <a:r>
-              <a:rPr lang="en-US" altLang="fr-FR" sz="2800" dirty="0"/>
-              <a:t> un </a:t>
-            </a:r>
-            <a:r>
-              <a:rPr lang="en-US" altLang="fr-FR" sz="2800" dirty="0" err="1"/>
-              <a:t>paragraphe</a:t>
-            </a:r>
-            <a:r>
-              <a:rPr lang="en-US" altLang="fr-FR" sz="2800" dirty="0"/>
-              <a:t>,</a:t>
+              <a:rPr lang="fr-FR" altLang="fr-FR" sz="2800" dirty="0"/>
+              <a:t>p définit un paragraphe,</a:t>
             </a:r>
           </a:p>
           <a:p>
@@ -41406,22 +40516,9 @@
               </a:tabLst>
             </a:pPr>
             <a:r>
-              <a:rPr lang="en-US" altLang="fr-FR" sz="2800" dirty="0"/>
-              <a:t>h1, h2, …, h6 </a:t>
-            </a:r>
-            <a:r>
-              <a:rPr lang="en-US" altLang="fr-FR" sz="2800" dirty="0" err="1"/>
-              <a:t>définissent</a:t>
-            </a:r>
-            <a:r>
-              <a:rPr lang="en-US" altLang="fr-FR" sz="2800" dirty="0"/>
-              <a:t> des </a:t>
-            </a:r>
-            <a:r>
-              <a:rPr lang="en-US" altLang="fr-FR" sz="2800" dirty="0" err="1"/>
-              <a:t>tritres</a:t>
-            </a:r>
-            <a:endParaRPr lang="en-US" altLang="fr-FR" sz="2800" dirty="0"/>
+              <a:rPr lang="fr-FR" altLang="fr-FR" sz="2800" dirty="0"/>
+              <a:t>h1, h2, …, h6 définissent des titres</a:t>
+            </a:r>
           </a:p>
           <a:p>
             <a:pPr marL="1144587" lvl="2" eaLnBrk="1" hangingPunct="1">
@@ -41453,20 +40550,8 @@
               </a:tabLst>
             </a:pPr>
             <a:r>
-              <a:rPr lang="en-US" altLang="fr-FR" sz="2800" dirty="0" err="1"/>
-              <a:t>L’element</a:t>
-            </a:r>
-            <a:r>
-              <a:rPr lang="en-US" altLang="fr-FR" sz="2800" dirty="0"/>
-              <a:t> a </a:t>
-            </a:r>
-            <a:r>
-              <a:rPr lang="en-US" altLang="fr-FR" sz="2800" dirty="0" err="1"/>
-              <a:t>défini</a:t>
-            </a:r>
-            <a:r>
-              <a:rPr lang="en-US" altLang="fr-FR" sz="2800" dirty="0"/>
-              <a:t> un lien, etc...</a:t>
+              <a:rPr lang="fr-FR" altLang="fr-FR" sz="2800" dirty="0"/>
+              <a:t>L’élément a défini un lien, etc...</a:t>
             </a:r>
           </a:p>
           <a:p>
@@ -41499,44 +40584,8 @@
               </a:tabLst>
             </a:pPr>
             <a:r>
-              <a:rPr lang="en-US" altLang="fr-FR" sz="2800" dirty="0" err="1"/>
-              <a:t>Généralement</a:t>
-            </a:r>
-            <a:r>
-              <a:rPr lang="en-US" altLang="fr-FR" sz="2800" dirty="0"/>
-              <a:t> </a:t>
-            </a:r>
-            <a:r>
-              <a:rPr lang="en-US" altLang="fr-FR" sz="2800" dirty="0" err="1"/>
-              <a:t>constitués</a:t>
-            </a:r>
-            <a:r>
-              <a:rPr lang="en-US" altLang="fr-FR" sz="2800" dirty="0"/>
-              <a:t> </a:t>
-            </a:r>
-            <a:r>
-              <a:rPr lang="en-US" altLang="fr-FR" sz="2800" dirty="0" err="1"/>
-              <a:t>d’une</a:t>
-            </a:r>
-            <a:r>
-              <a:rPr lang="en-US" altLang="fr-FR" sz="2800" dirty="0"/>
-              <a:t> </a:t>
-            </a:r>
-            <a:r>
-              <a:rPr lang="en-US" altLang="fr-FR" sz="2800" dirty="0" err="1"/>
-              <a:t>paire</a:t>
-            </a:r>
-            <a:r>
-              <a:rPr lang="en-US" altLang="fr-FR" sz="2800" dirty="0"/>
-              <a:t> de </a:t>
-            </a:r>
-            <a:r>
-              <a:rPr lang="en-US" altLang="fr-FR" sz="2800" dirty="0" err="1"/>
-              <a:t>balises</a:t>
-            </a:r>
-            <a:r>
-              <a:rPr lang="en-US" altLang="fr-FR" sz="2800" dirty="0"/>
-              <a:t> : </a:t>
+              <a:rPr lang="fr-FR" altLang="fr-FR" sz="2800" dirty="0"/>
+              <a:t>Généralement constitués d’une paire de balises : </a:t>
             </a:r>
           </a:p>
           <a:p>
@@ -41569,20 +40618,8 @@
               </a:tabLst>
             </a:pPr>
             <a:r>
-              <a:rPr lang="en-US" altLang="fr-FR" sz="2800" dirty="0" err="1"/>
-              <a:t>Balise</a:t>
-            </a:r>
-            <a:r>
-              <a:rPr lang="en-US" altLang="fr-FR" sz="2800" dirty="0"/>
-              <a:t> </a:t>
-            </a:r>
-            <a:r>
-              <a:rPr lang="en-US" altLang="fr-FR" sz="2800" dirty="0" err="1"/>
-              <a:t>ouvrante</a:t>
-            </a:r>
-            <a:r>
-              <a:rPr lang="en-US" altLang="fr-FR" sz="2800" dirty="0"/>
-              <a:t> &lt;p&gt;</a:t>
+              <a:rPr lang="fr-FR" altLang="fr-FR" sz="2800" dirty="0"/>
+              <a:t>Balise ouvrante &lt;p&gt;</a:t>
             </a:r>
           </a:p>
           <a:p>
@@ -41615,20 +40652,8 @@
               </a:tabLst>
             </a:pPr>
             <a:r>
-              <a:rPr lang="en-US" altLang="fr-FR" sz="2800" dirty="0" err="1"/>
-              <a:t>Balise</a:t>
-            </a:r>
-            <a:r>
-              <a:rPr lang="en-US" altLang="fr-FR" sz="2800" dirty="0"/>
-              <a:t> </a:t>
-            </a:r>
-            <a:r>
-              <a:rPr lang="en-US" altLang="fr-FR" sz="2800" dirty="0" err="1"/>
-              <a:t>fermante</a:t>
-            </a:r>
-            <a:r>
-              <a:rPr lang="en-US" altLang="fr-FR" sz="2800" dirty="0"/>
-              <a:t> &lt;/p&gt;</a:t>
+              <a:rPr lang="fr-FR" altLang="fr-FR" sz="2800" dirty="0"/>
+              <a:t>Balise fermante &lt;/p&gt;</a:t>
             </a:r>
           </a:p>
           <a:p>
@@ -41661,31 +40686,15 @@
               </a:tabLst>
             </a:pPr>
             <a:r>
-              <a:rPr lang="en-US" altLang="fr-FR" sz="2800" dirty="0"/>
-              <a:t>Exception : </a:t>
-            </a:r>
-            <a:r>
-              <a:rPr lang="en-US" altLang="fr-FR" sz="2800" dirty="0" err="1"/>
-              <a:t>balises</a:t>
-            </a:r>
-            <a:r>
-              <a:rPr lang="en-US" altLang="fr-FR" sz="2800" dirty="0"/>
-              <a:t> </a:t>
-            </a:r>
-            <a:r>
-              <a:rPr lang="en-US" altLang="fr-FR" sz="2800" dirty="0" err="1"/>
-              <a:t>orphelines</a:t>
-            </a:r>
-            <a:r>
-              <a:rPr lang="en-US" altLang="fr-FR" sz="2800" dirty="0"/>
-              <a:t> ex : &lt;</a:t>
-            </a:r>
-            <a:r>
-              <a:rPr lang="en-US" altLang="fr-FR" sz="2800" dirty="0" err="1"/>
-              <a:t>bt</a:t>
-            </a:r>
-            <a:r>
-              <a:rPr lang="en-US" altLang="fr-FR" sz="2800" dirty="0"/>
+              <a:rPr lang="fr-FR" altLang="fr-FR" sz="2800" dirty="0"/>
+              <a:t>Exception : balises orphelines ex : &lt;</a:t>
+            </a:r>
+            <a:r>
+              <a:rPr lang="fr-FR" altLang="fr-FR" sz="2800" dirty="0" err="1"/>
+              <a:t>br</a:t>
+            </a:r>
+            <a:r>
+              <a:rPr lang="fr-FR" altLang="fr-FR" sz="2800" dirty="0"/>
               <a:t>/&gt;</a:t>
             </a:r>
           </a:p>
@@ -41834,88 +40843,8 @@
               <a:defRPr/>
             </a:pPr>
             <a:r>
-              <a:rPr lang="en-US" altLang="fr-FR" dirty="0"/>
-              <a:t>Un </a:t>
-            </a:r>
-            <a:r>
-              <a:rPr lang="en-US" altLang="fr-FR" dirty="0" err="1"/>
-              <a:t>attribut</a:t>
-            </a:r>
-            <a:r>
-              <a:rPr lang="en-US" altLang="fr-FR" dirty="0"/>
-              <a:t> </a:t>
-            </a:r>
-            <a:r>
-              <a:rPr lang="en-US" altLang="fr-FR" dirty="0" err="1"/>
-              <a:t>est</a:t>
-            </a:r>
-            <a:r>
-              <a:rPr lang="en-US" altLang="fr-FR" dirty="0"/>
-              <a:t> </a:t>
-            </a:r>
-            <a:r>
-              <a:rPr lang="en-US" altLang="fr-FR" dirty="0" err="1"/>
-              <a:t>une</a:t>
-            </a:r>
-            <a:r>
-              <a:rPr lang="en-US" altLang="fr-FR" dirty="0"/>
-              <a:t> </a:t>
-            </a:r>
-            <a:r>
-              <a:rPr lang="en-US" altLang="fr-FR" dirty="0" err="1"/>
-              <a:t>propriété</a:t>
-            </a:r>
-            <a:r>
-              <a:rPr lang="en-US" altLang="fr-FR" dirty="0"/>
-              <a:t>, </a:t>
-            </a:r>
-            <a:r>
-              <a:rPr lang="en-US" altLang="fr-FR" dirty="0" err="1"/>
-              <a:t>une</a:t>
-            </a:r>
-            <a:r>
-              <a:rPr lang="en-US" altLang="fr-FR" dirty="0"/>
-              <a:t> information </a:t>
-            </a:r>
-            <a:r>
-              <a:rPr lang="en-US" altLang="fr-FR" dirty="0" err="1"/>
-              <a:t>supplémentaire</a:t>
-            </a:r>
-            <a:r>
-              <a:rPr lang="en-US" altLang="fr-FR" dirty="0"/>
-              <a:t> </a:t>
-            </a:r>
-            <a:r>
-              <a:rPr lang="en-US" altLang="fr-FR" dirty="0" err="1"/>
-              <a:t>dont</a:t>
-            </a:r>
-            <a:r>
-              <a:rPr lang="en-US" altLang="fr-FR" dirty="0"/>
-              <a:t> à </a:t>
-            </a:r>
-            <a:r>
-              <a:rPr lang="en-US" altLang="fr-FR" dirty="0" err="1"/>
-              <a:t>besoin</a:t>
-            </a:r>
-            <a:r>
-              <a:rPr lang="en-US" altLang="fr-FR" dirty="0"/>
-              <a:t> </a:t>
-            </a:r>
-            <a:r>
-              <a:rPr lang="en-US" altLang="fr-FR" dirty="0" err="1"/>
-              <a:t>notre</a:t>
-            </a:r>
-            <a:r>
-              <a:rPr lang="en-US" altLang="fr-FR" dirty="0"/>
-              <a:t> </a:t>
-            </a:r>
-            <a:r>
-              <a:rPr lang="en-US" altLang="fr-FR" dirty="0" err="1"/>
-              <a:t>élément</a:t>
-            </a:r>
-            <a:r>
-              <a:rPr lang="en-US" altLang="fr-FR" dirty="0"/>
-              <a:t>.</a:t>
+              <a:rPr lang="fr-FR" altLang="fr-FR" dirty="0"/>
+              <a:t>Un attribut est une propriété, une information supplémentaire dont à besoin notre élément.</a:t>
             </a:r>
           </a:p>
           <a:p>
@@ -41949,60 +40878,8 @@
               <a:defRPr/>
             </a:pPr>
             <a:r>
-              <a:rPr lang="en-US" altLang="fr-FR" dirty="0" err="1"/>
-              <a:t>Dans</a:t>
-            </a:r>
-            <a:r>
-              <a:rPr lang="en-US" altLang="fr-FR" dirty="0"/>
-              <a:t> </a:t>
-            </a:r>
-            <a:r>
-              <a:rPr lang="en-US" altLang="fr-FR" dirty="0" err="1"/>
-              <a:t>l’exemple</a:t>
-            </a:r>
-            <a:r>
-              <a:rPr lang="en-US" altLang="fr-FR" dirty="0"/>
-              <a:t> ci </a:t>
-            </a:r>
-            <a:r>
-              <a:rPr lang="en-US" altLang="fr-FR" dirty="0" err="1"/>
-              <a:t>dessous</a:t>
-            </a:r>
-            <a:r>
-              <a:rPr lang="en-US" altLang="fr-FR" dirty="0"/>
-              <a:t>, on </a:t>
-            </a:r>
-            <a:r>
-              <a:rPr lang="en-US" altLang="fr-FR" dirty="0" err="1"/>
-              <a:t>utilise</a:t>
-            </a:r>
-            <a:r>
-              <a:rPr lang="en-US" altLang="fr-FR" dirty="0"/>
-              <a:t> un </a:t>
-            </a:r>
-            <a:r>
-              <a:rPr lang="en-US" altLang="fr-FR" dirty="0" err="1"/>
-              <a:t>attribut</a:t>
-            </a:r>
-            <a:r>
-              <a:rPr lang="en-US" altLang="fr-FR" dirty="0"/>
-              <a:t> pour </a:t>
-            </a:r>
-            <a:r>
-              <a:rPr lang="en-US" altLang="fr-FR" dirty="0" err="1"/>
-              <a:t>définir</a:t>
-            </a:r>
-            <a:r>
-              <a:rPr lang="en-US" altLang="fr-FR" dirty="0"/>
-              <a:t> la </a:t>
-            </a:r>
-            <a:r>
-              <a:rPr lang="en-US" altLang="fr-FR" dirty="0" err="1"/>
-              <a:t>cible</a:t>
-            </a:r>
-            <a:r>
-              <a:rPr lang="en-US" altLang="fr-FR" dirty="0"/>
-              <a:t> du lien. </a:t>
+              <a:rPr lang="fr-FR" altLang="fr-FR" dirty="0"/>
+              <a:t>Dans l’exemple ci dessous, on utilise un attribut pour définir la cible du lien. </a:t>
             </a:r>
           </a:p>
           <a:p>
@@ -42035,7 +40912,7 @@
               </a:tabLst>
               <a:defRPr/>
             </a:pPr>
-            <a:endParaRPr lang="en-US" altLang="fr-FR" dirty="0"/>
+            <a:endParaRPr lang="fr-FR" altLang="fr-FR" dirty="0"/>
           </a:p>
           <a:p>
             <a:pPr marL="304800" indent="0" eaLnBrk="1" hangingPunct="1">
@@ -42067,7 +40944,7 @@
               <a:defRPr/>
             </a:pPr>
             <a:r>
-              <a:rPr lang="en-US" altLang="fr-FR" sz="2200" i="1" dirty="0"/>
+              <a:rPr lang="fr-FR" altLang="fr-FR" sz="2200" i="1" dirty="0"/>
               <a:t> </a:t>
             </a:r>
           </a:p>

</xml_diff>